<commit_message>
Correct the RPC client command line parameter in the PPT
</commit_message>
<xml_diff>
--- a/RPC Service - Coding Challenge.pptx
+++ b/RPC Service - Coding Challenge.pptx
@@ -113,6 +113,11 @@
       </a:defRPr>
     </a:lvl9pPr>
   </p:defaultTextStyle>
+  <p:extLst>
+    <p:ext uri="{EFAFB233-063F-42B5-8137-9DF3F51BA10A}">
+      <p15:sldGuideLst xmlns:p15="http://schemas.microsoft.com/office/powerpoint/2012/main"/>
+    </p:ext>
+  </p:extLst>
 </p:presentation>
 </file>
 
@@ -247,7 +252,7 @@
           <a:p>
             <a:fld id="{64A8010E-56E2-4E2E-B17E-D614B47B37A6}" type="datetimeFigureOut">
               <a:rPr lang="en-US" smtClean="0"/>
-              <a:t>12/9/2015</a:t>
+              <a:t>12/10/2015</a:t>
             </a:fld>
             <a:endParaRPr lang="en-US"/>
           </a:p>
@@ -417,7 +422,7 @@
           <a:p>
             <a:fld id="{64A8010E-56E2-4E2E-B17E-D614B47B37A6}" type="datetimeFigureOut">
               <a:rPr lang="en-US" smtClean="0"/>
-              <a:t>12/9/2015</a:t>
+              <a:t>12/10/2015</a:t>
             </a:fld>
             <a:endParaRPr lang="en-US"/>
           </a:p>
@@ -597,7 +602,7 @@
           <a:p>
             <a:fld id="{64A8010E-56E2-4E2E-B17E-D614B47B37A6}" type="datetimeFigureOut">
               <a:rPr lang="en-US" smtClean="0"/>
-              <a:t>12/9/2015</a:t>
+              <a:t>12/10/2015</a:t>
             </a:fld>
             <a:endParaRPr lang="en-US"/>
           </a:p>
@@ -767,7 +772,7 @@
           <a:p>
             <a:fld id="{64A8010E-56E2-4E2E-B17E-D614B47B37A6}" type="datetimeFigureOut">
               <a:rPr lang="en-US" smtClean="0"/>
-              <a:t>12/9/2015</a:t>
+              <a:t>12/10/2015</a:t>
             </a:fld>
             <a:endParaRPr lang="en-US"/>
           </a:p>
@@ -1013,7 +1018,7 @@
           <a:p>
             <a:fld id="{64A8010E-56E2-4E2E-B17E-D614B47B37A6}" type="datetimeFigureOut">
               <a:rPr lang="en-US" smtClean="0"/>
-              <a:t>12/9/2015</a:t>
+              <a:t>12/10/2015</a:t>
             </a:fld>
             <a:endParaRPr lang="en-US"/>
           </a:p>
@@ -1245,7 +1250,7 @@
           <a:p>
             <a:fld id="{64A8010E-56E2-4E2E-B17E-D614B47B37A6}" type="datetimeFigureOut">
               <a:rPr lang="en-US" smtClean="0"/>
-              <a:t>12/9/2015</a:t>
+              <a:t>12/10/2015</a:t>
             </a:fld>
             <a:endParaRPr lang="en-US"/>
           </a:p>
@@ -1612,7 +1617,7 @@
           <a:p>
             <a:fld id="{64A8010E-56E2-4E2E-B17E-D614B47B37A6}" type="datetimeFigureOut">
               <a:rPr lang="en-US" smtClean="0"/>
-              <a:t>12/9/2015</a:t>
+              <a:t>12/10/2015</a:t>
             </a:fld>
             <a:endParaRPr lang="en-US"/>
           </a:p>
@@ -1730,7 +1735,7 @@
           <a:p>
             <a:fld id="{64A8010E-56E2-4E2E-B17E-D614B47B37A6}" type="datetimeFigureOut">
               <a:rPr lang="en-US" smtClean="0"/>
-              <a:t>12/9/2015</a:t>
+              <a:t>12/10/2015</a:t>
             </a:fld>
             <a:endParaRPr lang="en-US"/>
           </a:p>
@@ -1825,7 +1830,7 @@
           <a:p>
             <a:fld id="{64A8010E-56E2-4E2E-B17E-D614B47B37A6}" type="datetimeFigureOut">
               <a:rPr lang="en-US" smtClean="0"/>
-              <a:t>12/9/2015</a:t>
+              <a:t>12/10/2015</a:t>
             </a:fld>
             <a:endParaRPr lang="en-US"/>
           </a:p>
@@ -2102,7 +2107,7 @@
           <a:p>
             <a:fld id="{64A8010E-56E2-4E2E-B17E-D614B47B37A6}" type="datetimeFigureOut">
               <a:rPr lang="en-US" smtClean="0"/>
-              <a:t>12/9/2015</a:t>
+              <a:t>12/10/2015</a:t>
             </a:fld>
             <a:endParaRPr lang="en-US"/>
           </a:p>
@@ -2355,7 +2360,7 @@
           <a:p>
             <a:fld id="{64A8010E-56E2-4E2E-B17E-D614B47B37A6}" type="datetimeFigureOut">
               <a:rPr lang="en-US" smtClean="0"/>
-              <a:t>12/9/2015</a:t>
+              <a:t>12/10/2015</a:t>
             </a:fld>
             <a:endParaRPr lang="en-US"/>
           </a:p>
@@ -2568,7 +2573,7 @@
           <a:p>
             <a:fld id="{64A8010E-56E2-4E2E-B17E-D614B47B37A6}" type="datetimeFigureOut">
               <a:rPr lang="en-US" smtClean="0"/>
-              <a:t>12/9/2015</a:t>
+              <a:t>12/10/2015</a:t>
             </a:fld>
             <a:endParaRPr lang="en-US"/>
           </a:p>
@@ -4099,14 +4104,35 @@
         <p:spPr/>
         <p:txBody>
           <a:bodyPr>
-            <a:normAutofit fontScale="92500" lnSpcReduction="20000"/>
+            <a:normAutofit fontScale="85000" lnSpcReduction="20000"/>
           </a:bodyPr>
           <a:lstStyle/>
           <a:p>
             <a:r>
               <a:rPr lang="en-US" dirty="0" smtClean="0"/>
-              <a:t>Pull the following projects from the GitHub link</a:t>
-            </a:r>
+              <a:t>Pull the following projects from the GitHub </a:t>
+            </a:r>
+            <a:r>
+              <a:rPr lang="en-US" dirty="0"/>
+              <a:t>link (</a:t>
+            </a:r>
+            <a:r>
+              <a:rPr lang="en-US" dirty="0">
+                <a:hlinkClick r:id="rId2"/>
+              </a:rPr>
+              <a:t>https://</a:t>
+            </a:r>
+            <a:r>
+              <a:rPr lang="en-US" dirty="0" smtClean="0">
+                <a:hlinkClick r:id="rId2"/>
+              </a:rPr>
+              <a:t>github.com/chavalipraveen/CodingExerciseAsyncRPCClientServer</a:t>
+            </a:r>
+            <a:r>
+              <a:rPr lang="en-US" dirty="0" smtClean="0"/>
+              <a:t>)</a:t>
+            </a:r>
+            <a:endParaRPr lang="en-US" dirty="0" smtClean="0"/>
           </a:p>
           <a:p>
             <a:pPr lvl="1"/>
@@ -4220,7 +4246,19 @@
             </a:r>
             <a:r>
               <a:rPr lang="en-US" dirty="0" smtClean="0"/>
-              <a:t> 2+(8-3)*6/2</a:t>
+              <a:t> 2+(8-3)*</a:t>
+            </a:r>
+            <a:r>
+              <a:rPr lang="en-US" dirty="0" smtClean="0"/>
+              <a:t>6/2;. (end </a:t>
+            </a:r>
+            <a:r>
+              <a:rPr lang="en-US" dirty="0" smtClean="0"/>
+              <a:t>the statement with a </a:t>
+            </a:r>
+            <a:r>
+              <a:rPr lang="en-US" smtClean="0"/>
+              <a:t>“;” followed by “.”)</a:t>
             </a:r>
             <a:endParaRPr lang="en-US" dirty="0" smtClean="0"/>
           </a:p>

</xml_diff>

<commit_message>
Added unit tests for the parser function on server and other bug fixes
</commit_message>
<xml_diff>
--- a/RPC Service - Coding Challenge.pptx
+++ b/RPC Service - Coding Challenge.pptx
@@ -3806,15 +3806,15 @@
             </a:r>
             <a:r>
               <a:rPr lang="en-US" dirty="0" smtClean="0"/>
-              <a:t>Terminal </a:t>
+              <a:t>Term { </a:t>
             </a:r>
             <a:r>
               <a:rPr lang="en-US" dirty="0"/>
-              <a:t>{ ( "+" | "-" ) </a:t>
-            </a:r>
-            <a:r>
-              <a:rPr lang="en-US" dirty="0" smtClean="0"/>
-              <a:t>Terminal </a:t>
+              <a:t>( "+" | "-" ) </a:t>
+            </a:r>
+            <a:r>
+              <a:rPr lang="en-US" dirty="0" smtClean="0"/>
+              <a:t>Term </a:t>
             </a:r>
             <a:r>
               <a:rPr lang="en-US" dirty="0"/>
@@ -3823,8 +3823,8 @@
           </a:p>
           <a:p>
             <a:r>
-              <a:rPr lang="en-US" dirty="0" smtClean="0"/>
-              <a:t>Terminal </a:t>
+              <a:rPr lang="en-US" smtClean="0"/>
+              <a:t>Term </a:t>
             </a:r>
             <a:r>
               <a:rPr lang="en-US" dirty="0"/>
@@ -4132,7 +4132,6 @@
               <a:rPr lang="en-US" dirty="0" smtClean="0"/>
               <a:t>)</a:t>
             </a:r>
-            <a:endParaRPr lang="en-US" dirty="0" smtClean="0"/>
           </a:p>
           <a:p>
             <a:pPr lvl="1"/>
@@ -4246,15 +4245,7 @@
             </a:r>
             <a:r>
               <a:rPr lang="en-US" dirty="0" smtClean="0"/>
-              <a:t> 2+(8-3)*</a:t>
-            </a:r>
-            <a:r>
-              <a:rPr lang="en-US" dirty="0" smtClean="0"/>
-              <a:t>6/2;. (end </a:t>
-            </a:r>
-            <a:r>
-              <a:rPr lang="en-US" dirty="0" smtClean="0"/>
-              <a:t>the statement with a </a:t>
+              <a:t> 2+(8-3)*6/2;. (end the statement with a </a:t>
             </a:r>
             <a:r>
               <a:rPr lang="en-US" smtClean="0"/>

</xml_diff>

<commit_message>
Added JUnit dependency to pom.xml of RPCServer
</commit_message>
<xml_diff>
--- a/RPC Service - Coding Challenge.pptx
+++ b/RPC Service - Coding Challenge.pptx
@@ -4025,7 +4025,21 @@
             </a:r>
             <a:r>
               <a:rPr lang="en-US" dirty="0" smtClean="0"/>
-              <a:t> configured logging</a:t>
+              <a:t> configured </a:t>
+            </a:r>
+            <a:r>
+              <a:rPr lang="en-US" dirty="0" smtClean="0"/>
+              <a:t>logging</a:t>
+            </a:r>
+          </a:p>
+          <a:p>
+            <a:r>
+              <a:rPr lang="en-US" dirty="0" smtClean="0"/>
+              <a:t>Junit: For </a:t>
+            </a:r>
+            <a:r>
+              <a:rPr lang="en-US" smtClean="0"/>
+              <a:t>unit testing</a:t>
             </a:r>
             <a:endParaRPr lang="en-US" dirty="0"/>
           </a:p>

</xml_diff>

<commit_message>
Add support for logical equals conditional
1 == 2 returns false; (4/2) == (1*2) returns true
</commit_message>
<xml_diff>
--- a/RPC Service - Coding Challenge.pptx
+++ b/RPC Service - Coding Challenge.pptx
@@ -252,7 +252,7 @@
           <a:p>
             <a:fld id="{64A8010E-56E2-4E2E-B17E-D614B47B37A6}" type="datetimeFigureOut">
               <a:rPr lang="en-US" smtClean="0"/>
-              <a:t>12/10/2015</a:t>
+              <a:t>12/15/2015</a:t>
             </a:fld>
             <a:endParaRPr lang="en-US"/>
           </a:p>
@@ -422,7 +422,7 @@
           <a:p>
             <a:fld id="{64A8010E-56E2-4E2E-B17E-D614B47B37A6}" type="datetimeFigureOut">
               <a:rPr lang="en-US" smtClean="0"/>
-              <a:t>12/10/2015</a:t>
+              <a:t>12/15/2015</a:t>
             </a:fld>
             <a:endParaRPr lang="en-US"/>
           </a:p>
@@ -602,7 +602,7 @@
           <a:p>
             <a:fld id="{64A8010E-56E2-4E2E-B17E-D614B47B37A6}" type="datetimeFigureOut">
               <a:rPr lang="en-US" smtClean="0"/>
-              <a:t>12/10/2015</a:t>
+              <a:t>12/15/2015</a:t>
             </a:fld>
             <a:endParaRPr lang="en-US"/>
           </a:p>
@@ -772,7 +772,7 @@
           <a:p>
             <a:fld id="{64A8010E-56E2-4E2E-B17E-D614B47B37A6}" type="datetimeFigureOut">
               <a:rPr lang="en-US" smtClean="0"/>
-              <a:t>12/10/2015</a:t>
+              <a:t>12/15/2015</a:t>
             </a:fld>
             <a:endParaRPr lang="en-US"/>
           </a:p>
@@ -1018,7 +1018,7 @@
           <a:p>
             <a:fld id="{64A8010E-56E2-4E2E-B17E-D614B47B37A6}" type="datetimeFigureOut">
               <a:rPr lang="en-US" smtClean="0"/>
-              <a:t>12/10/2015</a:t>
+              <a:t>12/15/2015</a:t>
             </a:fld>
             <a:endParaRPr lang="en-US"/>
           </a:p>
@@ -1250,7 +1250,7 @@
           <a:p>
             <a:fld id="{64A8010E-56E2-4E2E-B17E-D614B47B37A6}" type="datetimeFigureOut">
               <a:rPr lang="en-US" smtClean="0"/>
-              <a:t>12/10/2015</a:t>
+              <a:t>12/15/2015</a:t>
             </a:fld>
             <a:endParaRPr lang="en-US"/>
           </a:p>
@@ -1617,7 +1617,7 @@
           <a:p>
             <a:fld id="{64A8010E-56E2-4E2E-B17E-D614B47B37A6}" type="datetimeFigureOut">
               <a:rPr lang="en-US" smtClean="0"/>
-              <a:t>12/10/2015</a:t>
+              <a:t>12/15/2015</a:t>
             </a:fld>
             <a:endParaRPr lang="en-US"/>
           </a:p>
@@ -1735,7 +1735,7 @@
           <a:p>
             <a:fld id="{64A8010E-56E2-4E2E-B17E-D614B47B37A6}" type="datetimeFigureOut">
               <a:rPr lang="en-US" smtClean="0"/>
-              <a:t>12/10/2015</a:t>
+              <a:t>12/15/2015</a:t>
             </a:fld>
             <a:endParaRPr lang="en-US"/>
           </a:p>
@@ -1830,7 +1830,7 @@
           <a:p>
             <a:fld id="{64A8010E-56E2-4E2E-B17E-D614B47B37A6}" type="datetimeFigureOut">
               <a:rPr lang="en-US" smtClean="0"/>
-              <a:t>12/10/2015</a:t>
+              <a:t>12/15/2015</a:t>
             </a:fld>
             <a:endParaRPr lang="en-US"/>
           </a:p>
@@ -2107,7 +2107,7 @@
           <a:p>
             <a:fld id="{64A8010E-56E2-4E2E-B17E-D614B47B37A6}" type="datetimeFigureOut">
               <a:rPr lang="en-US" smtClean="0"/>
-              <a:t>12/10/2015</a:t>
+              <a:t>12/15/2015</a:t>
             </a:fld>
             <a:endParaRPr lang="en-US"/>
           </a:p>
@@ -2360,7 +2360,7 @@
           <a:p>
             <a:fld id="{64A8010E-56E2-4E2E-B17E-D614B47B37A6}" type="datetimeFigureOut">
               <a:rPr lang="en-US" smtClean="0"/>
-              <a:t>12/10/2015</a:t>
+              <a:t>12/15/2015</a:t>
             </a:fld>
             <a:endParaRPr lang="en-US"/>
           </a:p>
@@ -2573,7 +2573,7 @@
           <a:p>
             <a:fld id="{64A8010E-56E2-4E2E-B17E-D614B47B37A6}" type="datetimeFigureOut">
               <a:rPr lang="en-US" smtClean="0"/>
-              <a:t>12/10/2015</a:t>
+              <a:t>12/15/2015</a:t>
             </a:fld>
             <a:endParaRPr lang="en-US"/>
           </a:p>
@@ -3775,30 +3775,14 @@
         </p:nvSpPr>
         <p:spPr/>
         <p:txBody>
-          <a:bodyPr/>
+          <a:bodyPr>
+            <a:normAutofit fontScale="92500" lnSpcReduction="20000"/>
+          </a:bodyPr>
           <a:lstStyle/>
           <a:p>
             <a:r>
               <a:rPr lang="en-US" dirty="0" smtClean="0"/>
               <a:t>Statement </a:t>
-            </a:r>
-            <a:r>
-              <a:rPr lang="en-US" dirty="0"/>
-              <a:t>= { </a:t>
-            </a:r>
-            <a:r>
-              <a:rPr lang="en-US" dirty="0" smtClean="0"/>
-              <a:t>Expression </a:t>
-            </a:r>
-            <a:r>
-              <a:rPr lang="en-US" dirty="0"/>
-              <a:t>";" } "."</a:t>
-            </a:r>
-          </a:p>
-          <a:p>
-            <a:r>
-              <a:rPr lang="en-US" dirty="0" smtClean="0"/>
-              <a:t>Expression </a:t>
             </a:r>
             <a:r>
               <a:rPr lang="en-US" dirty="0"/>
@@ -3806,25 +3790,34 @@
             </a:r>
             <a:r>
               <a:rPr lang="en-US" dirty="0" smtClean="0"/>
-              <a:t>Term { </a:t>
+              <a:t>Expression </a:t>
             </a:r>
             <a:r>
               <a:rPr lang="en-US" dirty="0"/>
-              <a:t>( "+" | "-" ) </a:t>
-            </a:r>
-            <a:r>
-              <a:rPr lang="en-US" dirty="0" smtClean="0"/>
-              <a:t>Term </a:t>
+              <a:t>{ "=""=" </a:t>
+            </a:r>
+            <a:r>
+              <a:rPr lang="en-US" dirty="0" smtClean="0"/>
+              <a:t>Expression </a:t>
             </a:r>
             <a:r>
               <a:rPr lang="en-US" dirty="0"/>
-              <a:t>}</a:t>
-            </a:r>
-          </a:p>
-          <a:p>
-            <a:r>
-              <a:rPr lang="en-US" smtClean="0"/>
-              <a:t>Term </a:t>
+              <a:t>} </a:t>
+            </a:r>
+            <a:r>
+              <a:rPr lang="en-US" dirty="0" smtClean="0"/>
+              <a:t>“;” </a:t>
+            </a:r>
+            <a:r>
+              <a:rPr lang="en-US" dirty="0" smtClean="0"/>
+              <a:t>“.”</a:t>
+            </a:r>
+            <a:endParaRPr lang="en-US" dirty="0"/>
+          </a:p>
+          <a:p>
+            <a:r>
+              <a:rPr lang="en-US" dirty="0" smtClean="0"/>
+              <a:t>Expression </a:t>
             </a:r>
             <a:r>
               <a:rPr lang="en-US" dirty="0"/>
@@ -3832,56 +3825,129 @@
             </a:r>
             <a:r>
               <a:rPr lang="en-US" dirty="0" smtClean="0"/>
+              <a:t>Term “+” </a:t>
+            </a:r>
+            <a:r>
+              <a:rPr lang="en-US" dirty="0"/>
+              <a:t>| </a:t>
+            </a:r>
+            <a:r>
+              <a:rPr lang="en-US" dirty="0" smtClean="0"/>
+              <a:t>“-” Term</a:t>
+            </a:r>
+            <a:endParaRPr lang="en-US" dirty="0"/>
+          </a:p>
+          <a:p>
+            <a:r>
+              <a:rPr lang="en-US" dirty="0" smtClean="0"/>
+              <a:t>Term </a:t>
+            </a:r>
+            <a:r>
+              <a:rPr lang="en-US" dirty="0"/>
+              <a:t>= </a:t>
+            </a:r>
+            <a:r>
+              <a:rPr lang="en-US" dirty="0" smtClean="0"/>
+              <a:t>Factor “*” </a:t>
+            </a:r>
+            <a:r>
+              <a:rPr lang="en-US" dirty="0"/>
+              <a:t>| </a:t>
+            </a:r>
+            <a:r>
+              <a:rPr lang="en-US" dirty="0" smtClean="0"/>
+              <a:t>“/” Factor</a:t>
+            </a:r>
+            <a:endParaRPr lang="en-US" dirty="0"/>
+          </a:p>
+          <a:p>
+            <a:r>
+              <a:rPr lang="en-US" dirty="0" smtClean="0"/>
               <a:t>Factor </a:t>
             </a:r>
             <a:r>
               <a:rPr lang="en-US" dirty="0"/>
-              <a:t>{ ( "*" | "/" ) </a:t>
-            </a:r>
-            <a:r>
-              <a:rPr lang="en-US" dirty="0" smtClean="0"/>
-              <a:t>Factor </a:t>
-            </a:r>
+              <a:t>= NUMBER | </a:t>
+            </a:r>
+            <a:r>
+              <a:rPr lang="en-US" dirty="0" smtClean="0"/>
+              <a:t>“(“ Expression “)”</a:t>
+            </a:r>
+          </a:p>
+          <a:p>
+            <a:endParaRPr lang="en-US" dirty="0"/>
+          </a:p>
+          <a:p>
+            <a:r>
+              <a:rPr lang="en-US" dirty="0" smtClean="0"/>
+              <a:t>Examples:</a:t>
+            </a:r>
+          </a:p>
+          <a:p>
+            <a:pPr lvl="1"/>
+            <a:r>
+              <a:rPr lang="en-US" dirty="0" smtClean="0"/>
+              <a:t>3+9-2*4/2	</a:t>
+            </a:r>
+            <a:r>
+              <a:rPr lang="en-US" dirty="0" smtClean="0"/>
+              <a:t>		(</a:t>
+            </a:r>
+            <a:r>
+              <a:rPr lang="en-US" dirty="0" smtClean="0"/>
+              <a:t>result: 8)</a:t>
+            </a:r>
+          </a:p>
+          <a:p>
+            <a:pPr lvl="1"/>
+            <a:r>
+              <a:rPr lang="en-US" dirty="0" smtClean="0"/>
+              <a:t>3+(9-2)*4/2	</a:t>
+            </a:r>
+            <a:r>
+              <a:rPr lang="en-US" dirty="0" smtClean="0"/>
+              <a:t>		(</a:t>
+            </a:r>
+            <a:r>
+              <a:rPr lang="en-US" dirty="0" smtClean="0"/>
+              <a:t>result: 17</a:t>
+            </a:r>
+            <a:r>
+              <a:rPr lang="en-US" dirty="0" smtClean="0"/>
+              <a:t>)</a:t>
+            </a:r>
+          </a:p>
+          <a:p>
+            <a:pPr lvl="1"/>
             <a:r>
               <a:rPr lang="en-US" dirty="0"/>
-              <a:t>}</a:t>
-            </a:r>
-          </a:p>
-          <a:p>
-            <a:r>
-              <a:rPr lang="en-US" dirty="0" smtClean="0"/>
-              <a:t>Factor </a:t>
-            </a:r>
-            <a:r>
-              <a:rPr lang="en-US" dirty="0"/>
-              <a:t>= NUMBER | "(" </a:t>
-            </a:r>
-            <a:r>
-              <a:rPr lang="en-US" dirty="0" smtClean="0"/>
-              <a:t>Expression ")“</a:t>
-            </a:r>
-          </a:p>
-          <a:p>
-            <a:endParaRPr lang="en-US" dirty="0"/>
-          </a:p>
-          <a:p>
-            <a:r>
-              <a:rPr lang="en-US" dirty="0" smtClean="0"/>
-              <a:t>Examples:</a:t>
+              <a:t>3+(9-2)*</a:t>
+            </a:r>
+            <a:r>
+              <a:rPr lang="en-US" dirty="0" smtClean="0"/>
+              <a:t>4/2 == 3+9-2*4/2 	(result: false)</a:t>
             </a:r>
           </a:p>
           <a:p>
             <a:pPr lvl="1"/>
             <a:r>
               <a:rPr lang="en-US" dirty="0" smtClean="0"/>
-              <a:t>3+9-2*4/2	(result: 8)</a:t>
+              <a:t>3+9-2*4/2 == 8			(result: true)</a:t>
             </a:r>
           </a:p>
           <a:p>
             <a:pPr lvl="1"/>
             <a:r>
               <a:rPr lang="en-US" dirty="0" smtClean="0"/>
-              <a:t>3+(9-2)*4/2	(result: 17)</a:t>
+              <a:t>2 = = 2				(result</a:t>
+            </a:r>
+            <a:r>
+              <a:rPr lang="en-US" smtClean="0"/>
+              <a:t>: Exception; </a:t>
+            </a:r>
+            <a:r>
+              <a:rPr lang="en-US" dirty="0" smtClean="0"/>
+              <a:t>there is a space between the two ‘=‘)</a:t>
             </a:r>
             <a:endParaRPr lang="en-US" dirty="0"/>
           </a:p>
@@ -4025,11 +4091,7 @@
             </a:r>
             <a:r>
               <a:rPr lang="en-US" dirty="0" smtClean="0"/>
-              <a:t> configured </a:t>
-            </a:r>
-            <a:r>
-              <a:rPr lang="en-US" dirty="0" smtClean="0"/>
-              <a:t>logging</a:t>
+              <a:t> configured logging</a:t>
             </a:r>
           </a:p>
           <a:p>

</xml_diff>